<commit_message>
update comment on Convolutional neural network architecture for geometric matching
</commit_message>
<xml_diff>
--- a/Convolutional neural network architecture for geometric matching.pptx
+++ b/Convolutional neural network architecture for geometric matching.pptx
@@ -8,11 +8,12 @@
     <p:sldId id="256" r:id="rId2"/>
     <p:sldId id="257" r:id="rId3"/>
     <p:sldId id="258" r:id="rId4"/>
-    <p:sldId id="259" r:id="rId5"/>
-    <p:sldId id="260" r:id="rId6"/>
-    <p:sldId id="261" r:id="rId7"/>
-    <p:sldId id="262" r:id="rId8"/>
-    <p:sldId id="263" r:id="rId9"/>
+    <p:sldId id="264" r:id="rId5"/>
+    <p:sldId id="259" r:id="rId6"/>
+    <p:sldId id="260" r:id="rId7"/>
+    <p:sldId id="261" r:id="rId8"/>
+    <p:sldId id="262" r:id="rId9"/>
+    <p:sldId id="263" r:id="rId10"/>
   </p:sldIdLst>
   <p:sldSz cx="12192000" cy="6858000"/>
   <p:notesSz cx="6858000" cy="9144000"/>
@@ -111,6 +112,11 @@
       </a:defRPr>
     </a:lvl9pPr>
   </p:defaultTextStyle>
+  <p:extLst>
+    <p:ext uri="{EFAFB233-063F-42B5-8137-9DF3F51BA10A}">
+      <p15:sldGuideLst xmlns:p15="http://schemas.microsoft.com/office/powerpoint/2012/main"/>
+    </p:ext>
+  </p:extLst>
 </p:presentation>
 </file>
 
@@ -177,7 +183,7 @@
           </ac:picMkLst>
         </pc:picChg>
         <pc:picChg chg="add del">
-          <ac:chgData name="Zhao, Zhihao" userId="25f230c4-357c-44aa-9f56-3a1d9de1528e" providerId="ADAL" clId="{B0CEBF00-35AD-41FE-90B1-EBCA559AE8DC}" dt="2018-04-02T06:11:25.544" v="138"/>
+          <ac:chgData name="Zhao, Zhihao" userId="25f230c4-357c-44aa-9f56-3a1d9de1528e" providerId="ADAL" clId="{B0CEBF00-35AD-41FE-90B1-EBCA559AE8DC}" dt="2018-04-02T06:11:25.544" v="138" actId="1076"/>
           <ac:picMkLst>
             <pc:docMk/>
             <pc:sldMk cId="3609996632" sldId="257"/>
@@ -233,7 +239,7 @@
         </pc:picChg>
       </pc:sldChg>
       <pc:sldChg chg="addSp delSp modSp add">
-        <pc:chgData name="Zhao, Zhihao" userId="25f230c4-357c-44aa-9f56-3a1d9de1528e" providerId="ADAL" clId="{B0CEBF00-35AD-41FE-90B1-EBCA559AE8DC}" dt="2018-04-02T06:26:05.123" v="982"/>
+        <pc:chgData name="Zhao, Zhihao" userId="25f230c4-357c-44aa-9f56-3a1d9de1528e" providerId="ADAL" clId="{B0CEBF00-35AD-41FE-90B1-EBCA559AE8DC}" dt="2018-04-02T06:26:05.123" v="982" actId="20577"/>
         <pc:sldMkLst>
           <pc:docMk/>
           <pc:sldMk cId="1250287202" sldId="259"/>
@@ -263,7 +269,7 @@
           </ac:picMkLst>
         </pc:picChg>
         <pc:picChg chg="add del mod">
-          <ac:chgData name="Zhao, Zhihao" userId="25f230c4-357c-44aa-9f56-3a1d9de1528e" providerId="ADAL" clId="{B0CEBF00-35AD-41FE-90B1-EBCA559AE8DC}" dt="2018-04-02T06:26:05.123" v="982"/>
+          <ac:chgData name="Zhao, Zhihao" userId="25f230c4-357c-44aa-9f56-3a1d9de1528e" providerId="ADAL" clId="{B0CEBF00-35AD-41FE-90B1-EBCA559AE8DC}" dt="2018-04-02T06:26:05.123" v="982" actId="20577"/>
           <ac:picMkLst>
             <pc:docMk/>
             <pc:sldMk cId="1250287202" sldId="259"/>
@@ -294,7 +300,7 @@
           </ac:spMkLst>
         </pc:spChg>
         <pc:picChg chg="add del mod">
-          <ac:chgData name="Zhao, Zhihao" userId="25f230c4-357c-44aa-9f56-3a1d9de1528e" providerId="ADAL" clId="{B0CEBF00-35AD-41FE-90B1-EBCA559AE8DC}" dt="2018-04-02T06:30:47.134" v="1077"/>
+          <ac:chgData name="Zhao, Zhihao" userId="25f230c4-357c-44aa-9f56-3a1d9de1528e" providerId="ADAL" clId="{B0CEBF00-35AD-41FE-90B1-EBCA559AE8DC}" dt="2018-04-02T06:30:47.134" v="1077" actId="20577"/>
           <ac:picMkLst>
             <pc:docMk/>
             <pc:sldMk cId="1365652696" sldId="260"/>
@@ -400,6 +406,30 @@
             <pc:docMk/>
             <pc:sldMk cId="2471833541" sldId="263"/>
             <ac:spMk id="3" creationId="{D45951F3-54CF-48A2-9543-73EB2D982081}"/>
+          </ac:spMkLst>
+        </pc:spChg>
+      </pc:sldChg>
+    </pc:docChg>
+  </pc:docChgLst>
+  <pc:docChgLst>
+    <pc:chgData name="Zhihao Zhao" userId="25f230c4-357c-44aa-9f56-3a1d9de1528e" providerId="ADAL" clId="{B0CEBF00-35AD-41FE-90B1-EBCA559AE8DC}"/>
+    <pc:docChg chg="addSld modSld">
+      <pc:chgData name="Zhihao Zhao" userId="25f230c4-357c-44aa-9f56-3a1d9de1528e" providerId="ADAL" clId="{B0CEBF00-35AD-41FE-90B1-EBCA559AE8DC}" dt="2018-04-02T07:29:56.050" v="177" actId="6549"/>
+      <pc:docMkLst>
+        <pc:docMk/>
+      </pc:docMkLst>
+      <pc:sldChg chg="modSp add">
+        <pc:chgData name="Zhihao Zhao" userId="25f230c4-357c-44aa-9f56-3a1d9de1528e" providerId="ADAL" clId="{B0CEBF00-35AD-41FE-90B1-EBCA559AE8DC}" dt="2018-04-02T07:29:56.050" v="177" actId="6549"/>
+        <pc:sldMkLst>
+          <pc:docMk/>
+          <pc:sldMk cId="264233570" sldId="264"/>
+        </pc:sldMkLst>
+        <pc:spChg chg="mod">
+          <ac:chgData name="Zhihao Zhao" userId="25f230c4-357c-44aa-9f56-3a1d9de1528e" providerId="ADAL" clId="{B0CEBF00-35AD-41FE-90B1-EBCA559AE8DC}" dt="2018-04-02T07:29:56.050" v="177" actId="6549"/>
+          <ac:spMkLst>
+            <pc:docMk/>
+            <pc:sldMk cId="264233570" sldId="264"/>
+            <ac:spMk id="3" creationId="{A12B6136-0576-4FEB-8E2E-CB01D86A7774}"/>
           </ac:spMkLst>
         </pc:spChg>
       </pc:sldChg>
@@ -4090,6 +4120,198 @@
           <p:cNvPr id="2" name="Title 1">
             <a:extLst>
               <a:ext uri="{FF2B5EF4-FFF2-40B4-BE49-F238E27FC236}">
+                <a16:creationId xmlns:a16="http://schemas.microsoft.com/office/drawing/2014/main" id="{3F297232-8F06-43DA-8C8A-2996CD0BCD20}"/>
+              </a:ext>
+            </a:extLst>
+          </p:cNvPr>
+          <p:cNvSpPr>
+            <a:spLocks noGrp="1"/>
+          </p:cNvSpPr>
+          <p:nvPr>
+            <p:ph type="title"/>
+          </p:nvPr>
+        </p:nvSpPr>
+        <p:spPr/>
+        <p:txBody>
+          <a:bodyPr/>
+          <a:lstStyle/>
+          <a:p>
+            <a:r>
+              <a:rPr lang="en-US" dirty="0"/>
+              <a:t>Matching descriptors</a:t>
+            </a:r>
+          </a:p>
+        </p:txBody>
+      </p:sp>
+      <p:sp>
+        <p:nvSpPr>
+          <p:cNvPr id="3" name="Content Placeholder 2">
+            <a:extLst>
+              <a:ext uri="{FF2B5EF4-FFF2-40B4-BE49-F238E27FC236}">
+                <a16:creationId xmlns:a16="http://schemas.microsoft.com/office/drawing/2014/main" id="{A12B6136-0576-4FEB-8E2E-CB01D86A7774}"/>
+              </a:ext>
+            </a:extLst>
+          </p:cNvPr>
+          <p:cNvSpPr>
+            <a:spLocks noGrp="1"/>
+          </p:cNvSpPr>
+          <p:nvPr>
+            <p:ph idx="1"/>
+          </p:nvPr>
+        </p:nvSpPr>
+        <p:spPr>
+          <a:xfrm>
+            <a:off x="7168580" y="1825625"/>
+            <a:ext cx="4185219" cy="4667250"/>
+          </a:xfrm>
+        </p:spPr>
+        <p:txBody>
+          <a:bodyPr>
+            <a:normAutofit/>
+          </a:bodyPr>
+          <a:lstStyle/>
+          <a:p>
+            <a:r>
+              <a:rPr lang="en-US" sz="2000" dirty="0"/>
+              <a:t>For matching, or correlation between the key points in the two input images, the author simply uses dot product. Here the dot product is their cosine distance, since they both are unit vector.</a:t>
+            </a:r>
+          </a:p>
+          <a:p>
+            <a:endParaRPr lang="en-US" sz="2000" dirty="0"/>
+          </a:p>
+          <a:p>
+            <a:r>
+              <a:rPr lang="en-US" sz="2000" dirty="0"/>
+              <a:t>The notation here is a little confusing. </a:t>
+            </a:r>
+          </a:p>
+          <a:p>
+            <a:r>
+              <a:rPr lang="en-US" sz="2000" dirty="0"/>
+              <a:t>Compared to traditional methods, here C_AB is dense matching, not only key points extracted by </a:t>
+            </a:r>
+            <a:r>
+              <a:rPr lang="en-US" sz="2000" dirty="0" err="1"/>
+              <a:t>e.g</a:t>
+            </a:r>
+            <a:r>
+              <a:rPr lang="en-US" sz="2000" dirty="0"/>
+              <a:t>, </a:t>
+            </a:r>
+            <a:r>
+              <a:rPr lang="en-US" sz="2000" dirty="0" err="1"/>
+              <a:t>harris</a:t>
+            </a:r>
+            <a:r>
+              <a:rPr lang="en-US" sz="2000" dirty="0"/>
+              <a:t> in the </a:t>
+            </a:r>
+            <a:r>
+              <a:rPr lang="en-US" sz="2000"/>
+              <a:t>tradional</a:t>
+            </a:r>
+            <a:r>
+              <a:rPr lang="en-US" sz="2000" dirty="0"/>
+              <a:t> methods.</a:t>
+            </a:r>
+          </a:p>
+        </p:txBody>
+      </p:sp>
+      <p:pic>
+        <p:nvPicPr>
+          <p:cNvPr id="4" name="Picture 3">
+            <a:extLst>
+              <a:ext uri="{FF2B5EF4-FFF2-40B4-BE49-F238E27FC236}">
+                <a16:creationId xmlns:a16="http://schemas.microsoft.com/office/drawing/2014/main" id="{9C5EE905-D54C-49E4-89C1-5398D1DD5552}"/>
+              </a:ext>
+            </a:extLst>
+          </p:cNvPr>
+          <p:cNvPicPr>
+            <a:picLocks noChangeAspect="1"/>
+          </p:cNvPicPr>
+          <p:nvPr/>
+        </p:nvPicPr>
+        <p:blipFill>
+          <a:blip r:embed="rId2"/>
+          <a:stretch>
+            <a:fillRect/>
+          </a:stretch>
+        </p:blipFill>
+        <p:spPr>
+          <a:xfrm>
+            <a:off x="944186" y="1555954"/>
+            <a:ext cx="6118408" cy="4621009"/>
+          </a:xfrm>
+          <a:prstGeom prst="rect">
+            <a:avLst/>
+          </a:prstGeom>
+        </p:spPr>
+      </p:pic>
+      <p:pic>
+        <p:nvPicPr>
+          <p:cNvPr id="5" name="Picture 4">
+            <a:extLst>
+              <a:ext uri="{FF2B5EF4-FFF2-40B4-BE49-F238E27FC236}">
+                <a16:creationId xmlns:a16="http://schemas.microsoft.com/office/drawing/2014/main" id="{CA582EE8-3315-4F97-966A-89D8694E172B}"/>
+              </a:ext>
+            </a:extLst>
+          </p:cNvPr>
+          <p:cNvPicPr>
+            <a:picLocks noChangeAspect="1"/>
+          </p:cNvPicPr>
+          <p:nvPr/>
+        </p:nvPicPr>
+        <p:blipFill>
+          <a:blip r:embed="rId3"/>
+          <a:stretch>
+            <a:fillRect/>
+          </a:stretch>
+        </p:blipFill>
+        <p:spPr>
+          <a:xfrm>
+            <a:off x="7727244" y="3649328"/>
+            <a:ext cx="2961905" cy="361905"/>
+          </a:xfrm>
+          <a:prstGeom prst="rect">
+            <a:avLst/>
+          </a:prstGeom>
+        </p:spPr>
+      </p:pic>
+    </p:spTree>
+    <p:extLst>
+      <p:ext uri="{BB962C8B-B14F-4D97-AF65-F5344CB8AC3E}">
+        <p14:creationId xmlns:p14="http://schemas.microsoft.com/office/powerpoint/2010/main" val="264233570"/>
+      </p:ext>
+    </p:extLst>
+  </p:cSld>
+  <p:clrMapOvr>
+    <a:masterClrMapping/>
+  </p:clrMapOvr>
+</p:sld>
+</file>
+
+<file path=ppt/slides/slide5.xml><?xml version="1.0" encoding="utf-8"?>
+<p:sld xmlns:a="http://schemas.openxmlformats.org/drawingml/2006/main" xmlns:r="http://schemas.openxmlformats.org/officeDocument/2006/relationships" xmlns:p="http://schemas.openxmlformats.org/presentationml/2006/main">
+  <p:cSld>
+    <p:spTree>
+      <p:nvGrpSpPr>
+        <p:cNvPr id="1" name=""/>
+        <p:cNvGrpSpPr/>
+        <p:nvPr/>
+      </p:nvGrpSpPr>
+      <p:grpSpPr>
+        <a:xfrm>
+          <a:off x="0" y="0"/>
+          <a:ext cx="0" cy="0"/>
+          <a:chOff x="0" y="0"/>
+          <a:chExt cx="0" cy="0"/>
+        </a:xfrm>
+      </p:grpSpPr>
+      <p:sp>
+        <p:nvSpPr>
+          <p:cNvPr id="2" name="Title 1">
+            <a:extLst>
+              <a:ext uri="{FF2B5EF4-FFF2-40B4-BE49-F238E27FC236}">
                 <a16:creationId xmlns:a16="http://schemas.microsoft.com/office/drawing/2014/main" id="{0CB8478F-8B73-4B05-9452-6624C56D6E72}"/>
               </a:ext>
             </a:extLst>
@@ -4186,7 +4408,7 @@
 </p:sld>
 </file>
 
-<file path=ppt/slides/slide5.xml><?xml version="1.0" encoding="utf-8"?>
+<file path=ppt/slides/slide6.xml><?xml version="1.0" encoding="utf-8"?>
 <p:sld xmlns:a="http://schemas.openxmlformats.org/drawingml/2006/main" xmlns:r="http://schemas.openxmlformats.org/officeDocument/2006/relationships" xmlns:p="http://schemas.openxmlformats.org/presentationml/2006/main">
   <p:cSld>
     <p:spTree>
@@ -4332,7 +4554,7 @@
 </p:sld>
 </file>
 
-<file path=ppt/slides/slide6.xml><?xml version="1.0" encoding="utf-8"?>
+<file path=ppt/slides/slide7.xml><?xml version="1.0" encoding="utf-8"?>
 <p:sld xmlns:a="http://schemas.openxmlformats.org/drawingml/2006/main" xmlns:r="http://schemas.openxmlformats.org/officeDocument/2006/relationships" xmlns:p="http://schemas.openxmlformats.org/presentationml/2006/main">
   <p:cSld>
     <p:spTree>
@@ -4463,7 +4685,7 @@
 </p:sld>
 </file>
 
-<file path=ppt/slides/slide7.xml><?xml version="1.0" encoding="utf-8"?>
+<file path=ppt/slides/slide8.xml><?xml version="1.0" encoding="utf-8"?>
 <p:sld xmlns:a="http://schemas.openxmlformats.org/drawingml/2006/main" xmlns:r="http://schemas.openxmlformats.org/officeDocument/2006/relationships" xmlns:p="http://schemas.openxmlformats.org/presentationml/2006/main">
   <p:cSld>
     <p:spTree>
@@ -4582,7 +4804,7 @@
 </p:sld>
 </file>
 
-<file path=ppt/slides/slide8.xml><?xml version="1.0" encoding="utf-8"?>
+<file path=ppt/slides/slide9.xml><?xml version="1.0" encoding="utf-8"?>
 <p:sld xmlns:a="http://schemas.openxmlformats.org/drawingml/2006/main" xmlns:r="http://schemas.openxmlformats.org/officeDocument/2006/relationships" xmlns:p="http://schemas.openxmlformats.org/presentationml/2006/main">
   <p:cSld>
     <p:spTree>

</xml_diff>